<commit_message>
- update database  - update source code
</commit_message>
<xml_diff>
--- a/Tags/Database/DatabaseDesign_V2.pptx
+++ b/Tags/Database/DatabaseDesign_V2.pptx
@@ -243,7 +243,8 @@
           <a:p>
             <a:fld id="{BA2168AF-9664-40AD-BDE2-4452FE7BA3C6}" type="datetimeFigureOut">
               <a:rPr lang="en-US" smtClean="0"/>
-              <a:t>9/29/2015</a:t>
+              <a:pPr/>
+              <a:t>10/28/2015</a:t>
             </a:fld>
             <a:endParaRPr lang="en-US"/>
           </a:p>
@@ -285,6 +286,7 @@
           <a:p>
             <a:fld id="{E5FBB719-B71D-4C4E-B6FC-9E88D38C766C}" type="slidenum">
               <a:rPr lang="en-US" smtClean="0"/>
+              <a:pPr/>
               <a:t>‹#›</a:t>
             </a:fld>
             <a:endParaRPr lang="en-US"/>
@@ -294,7 +296,7 @@
     </p:spTree>
     <p:extLst>
       <p:ext uri="{BB962C8B-B14F-4D97-AF65-F5344CB8AC3E}">
-        <p14:creationId xmlns:p14="http://schemas.microsoft.com/office/powerpoint/2010/main" val="3813746380"/>
+        <p14:creationId xmlns:p14="http://schemas.microsoft.com/office/powerpoint/2010/main" xmlns="" val="3813746380"/>
       </p:ext>
     </p:extLst>
   </p:cSld>
@@ -413,7 +415,8 @@
           <a:p>
             <a:fld id="{BA2168AF-9664-40AD-BDE2-4452FE7BA3C6}" type="datetimeFigureOut">
               <a:rPr lang="en-US" smtClean="0"/>
-              <a:t>9/29/2015</a:t>
+              <a:pPr/>
+              <a:t>10/28/2015</a:t>
             </a:fld>
             <a:endParaRPr lang="en-US"/>
           </a:p>
@@ -455,6 +458,7 @@
           <a:p>
             <a:fld id="{E5FBB719-B71D-4C4E-B6FC-9E88D38C766C}" type="slidenum">
               <a:rPr lang="en-US" smtClean="0"/>
+              <a:pPr/>
               <a:t>‹#›</a:t>
             </a:fld>
             <a:endParaRPr lang="en-US"/>
@@ -464,7 +468,7 @@
     </p:spTree>
     <p:extLst>
       <p:ext uri="{BB962C8B-B14F-4D97-AF65-F5344CB8AC3E}">
-        <p14:creationId xmlns:p14="http://schemas.microsoft.com/office/powerpoint/2010/main" val="1978048032"/>
+        <p14:creationId xmlns:p14="http://schemas.microsoft.com/office/powerpoint/2010/main" xmlns="" val="1978048032"/>
       </p:ext>
     </p:extLst>
   </p:cSld>
@@ -593,7 +597,8 @@
           <a:p>
             <a:fld id="{BA2168AF-9664-40AD-BDE2-4452FE7BA3C6}" type="datetimeFigureOut">
               <a:rPr lang="en-US" smtClean="0"/>
-              <a:t>9/29/2015</a:t>
+              <a:pPr/>
+              <a:t>10/28/2015</a:t>
             </a:fld>
             <a:endParaRPr lang="en-US"/>
           </a:p>
@@ -635,6 +640,7 @@
           <a:p>
             <a:fld id="{E5FBB719-B71D-4C4E-B6FC-9E88D38C766C}" type="slidenum">
               <a:rPr lang="en-US" smtClean="0"/>
+              <a:pPr/>
               <a:t>‹#›</a:t>
             </a:fld>
             <a:endParaRPr lang="en-US"/>
@@ -644,7 +650,7 @@
     </p:spTree>
     <p:extLst>
       <p:ext uri="{BB962C8B-B14F-4D97-AF65-F5344CB8AC3E}">
-        <p14:creationId xmlns:p14="http://schemas.microsoft.com/office/powerpoint/2010/main" val="2105176745"/>
+        <p14:creationId xmlns:p14="http://schemas.microsoft.com/office/powerpoint/2010/main" xmlns="" val="2105176745"/>
       </p:ext>
     </p:extLst>
   </p:cSld>
@@ -763,7 +769,8 @@
           <a:p>
             <a:fld id="{BA2168AF-9664-40AD-BDE2-4452FE7BA3C6}" type="datetimeFigureOut">
               <a:rPr lang="en-US" smtClean="0"/>
-              <a:t>9/29/2015</a:t>
+              <a:pPr/>
+              <a:t>10/28/2015</a:t>
             </a:fld>
             <a:endParaRPr lang="en-US"/>
           </a:p>
@@ -805,6 +812,7 @@
           <a:p>
             <a:fld id="{E5FBB719-B71D-4C4E-B6FC-9E88D38C766C}" type="slidenum">
               <a:rPr lang="en-US" smtClean="0"/>
+              <a:pPr/>
               <a:t>‹#›</a:t>
             </a:fld>
             <a:endParaRPr lang="en-US"/>
@@ -814,7 +822,7 @@
     </p:spTree>
     <p:extLst>
       <p:ext uri="{BB962C8B-B14F-4D97-AF65-F5344CB8AC3E}">
-        <p14:creationId xmlns:p14="http://schemas.microsoft.com/office/powerpoint/2010/main" val="3237410288"/>
+        <p14:creationId xmlns:p14="http://schemas.microsoft.com/office/powerpoint/2010/main" xmlns="" val="3237410288"/>
       </p:ext>
     </p:extLst>
   </p:cSld>
@@ -1009,7 +1017,8 @@
           <a:p>
             <a:fld id="{BA2168AF-9664-40AD-BDE2-4452FE7BA3C6}" type="datetimeFigureOut">
               <a:rPr lang="en-US" smtClean="0"/>
-              <a:t>9/29/2015</a:t>
+              <a:pPr/>
+              <a:t>10/28/2015</a:t>
             </a:fld>
             <a:endParaRPr lang="en-US"/>
           </a:p>
@@ -1051,6 +1060,7 @@
           <a:p>
             <a:fld id="{E5FBB719-B71D-4C4E-B6FC-9E88D38C766C}" type="slidenum">
               <a:rPr lang="en-US" smtClean="0"/>
+              <a:pPr/>
               <a:t>‹#›</a:t>
             </a:fld>
             <a:endParaRPr lang="en-US"/>
@@ -1060,7 +1070,7 @@
     </p:spTree>
     <p:extLst>
       <p:ext uri="{BB962C8B-B14F-4D97-AF65-F5344CB8AC3E}">
-        <p14:creationId xmlns:p14="http://schemas.microsoft.com/office/powerpoint/2010/main" val="4019724857"/>
+        <p14:creationId xmlns:p14="http://schemas.microsoft.com/office/powerpoint/2010/main" xmlns="" val="4019724857"/>
       </p:ext>
     </p:extLst>
   </p:cSld>
@@ -1241,7 +1251,8 @@
           <a:p>
             <a:fld id="{BA2168AF-9664-40AD-BDE2-4452FE7BA3C6}" type="datetimeFigureOut">
               <a:rPr lang="en-US" smtClean="0"/>
-              <a:t>9/29/2015</a:t>
+              <a:pPr/>
+              <a:t>10/28/2015</a:t>
             </a:fld>
             <a:endParaRPr lang="en-US"/>
           </a:p>
@@ -1283,6 +1294,7 @@
           <a:p>
             <a:fld id="{E5FBB719-B71D-4C4E-B6FC-9E88D38C766C}" type="slidenum">
               <a:rPr lang="en-US" smtClean="0"/>
+              <a:pPr/>
               <a:t>‹#›</a:t>
             </a:fld>
             <a:endParaRPr lang="en-US"/>
@@ -1292,7 +1304,7 @@
     </p:spTree>
     <p:extLst>
       <p:ext uri="{BB962C8B-B14F-4D97-AF65-F5344CB8AC3E}">
-        <p14:creationId xmlns:p14="http://schemas.microsoft.com/office/powerpoint/2010/main" val="3357370416"/>
+        <p14:creationId xmlns:p14="http://schemas.microsoft.com/office/powerpoint/2010/main" xmlns="" val="3357370416"/>
       </p:ext>
     </p:extLst>
   </p:cSld>
@@ -1608,7 +1620,8 @@
           <a:p>
             <a:fld id="{BA2168AF-9664-40AD-BDE2-4452FE7BA3C6}" type="datetimeFigureOut">
               <a:rPr lang="en-US" smtClean="0"/>
-              <a:t>9/29/2015</a:t>
+              <a:pPr/>
+              <a:t>10/28/2015</a:t>
             </a:fld>
             <a:endParaRPr lang="en-US"/>
           </a:p>
@@ -1650,6 +1663,7 @@
           <a:p>
             <a:fld id="{E5FBB719-B71D-4C4E-B6FC-9E88D38C766C}" type="slidenum">
               <a:rPr lang="en-US" smtClean="0"/>
+              <a:pPr/>
               <a:t>‹#›</a:t>
             </a:fld>
             <a:endParaRPr lang="en-US"/>
@@ -1659,7 +1673,7 @@
     </p:spTree>
     <p:extLst>
       <p:ext uri="{BB962C8B-B14F-4D97-AF65-F5344CB8AC3E}">
-        <p14:creationId xmlns:p14="http://schemas.microsoft.com/office/powerpoint/2010/main" val="4186753810"/>
+        <p14:creationId xmlns:p14="http://schemas.microsoft.com/office/powerpoint/2010/main" xmlns="" val="4186753810"/>
       </p:ext>
     </p:extLst>
   </p:cSld>
@@ -1726,7 +1740,8 @@
           <a:p>
             <a:fld id="{BA2168AF-9664-40AD-BDE2-4452FE7BA3C6}" type="datetimeFigureOut">
               <a:rPr lang="en-US" smtClean="0"/>
-              <a:t>9/29/2015</a:t>
+              <a:pPr/>
+              <a:t>10/28/2015</a:t>
             </a:fld>
             <a:endParaRPr lang="en-US"/>
           </a:p>
@@ -1768,6 +1783,7 @@
           <a:p>
             <a:fld id="{E5FBB719-B71D-4C4E-B6FC-9E88D38C766C}" type="slidenum">
               <a:rPr lang="en-US" smtClean="0"/>
+              <a:pPr/>
               <a:t>‹#›</a:t>
             </a:fld>
             <a:endParaRPr lang="en-US"/>
@@ -1777,7 +1793,7 @@
     </p:spTree>
     <p:extLst>
       <p:ext uri="{BB962C8B-B14F-4D97-AF65-F5344CB8AC3E}">
-        <p14:creationId xmlns:p14="http://schemas.microsoft.com/office/powerpoint/2010/main" val="1915232082"/>
+        <p14:creationId xmlns:p14="http://schemas.microsoft.com/office/powerpoint/2010/main" xmlns="" val="1915232082"/>
       </p:ext>
     </p:extLst>
   </p:cSld>
@@ -1821,7 +1837,8 @@
           <a:p>
             <a:fld id="{BA2168AF-9664-40AD-BDE2-4452FE7BA3C6}" type="datetimeFigureOut">
               <a:rPr lang="en-US" smtClean="0"/>
-              <a:t>9/29/2015</a:t>
+              <a:pPr/>
+              <a:t>10/28/2015</a:t>
             </a:fld>
             <a:endParaRPr lang="en-US"/>
           </a:p>
@@ -1863,6 +1880,7 @@
           <a:p>
             <a:fld id="{E5FBB719-B71D-4C4E-B6FC-9E88D38C766C}" type="slidenum">
               <a:rPr lang="en-US" smtClean="0"/>
+              <a:pPr/>
               <a:t>‹#›</a:t>
             </a:fld>
             <a:endParaRPr lang="en-US"/>
@@ -1872,7 +1890,7 @@
     </p:spTree>
     <p:extLst>
       <p:ext uri="{BB962C8B-B14F-4D97-AF65-F5344CB8AC3E}">
-        <p14:creationId xmlns:p14="http://schemas.microsoft.com/office/powerpoint/2010/main" val="891009138"/>
+        <p14:creationId xmlns:p14="http://schemas.microsoft.com/office/powerpoint/2010/main" xmlns="" val="891009138"/>
       </p:ext>
     </p:extLst>
   </p:cSld>
@@ -2098,7 +2116,8 @@
           <a:p>
             <a:fld id="{BA2168AF-9664-40AD-BDE2-4452FE7BA3C6}" type="datetimeFigureOut">
               <a:rPr lang="en-US" smtClean="0"/>
-              <a:t>9/29/2015</a:t>
+              <a:pPr/>
+              <a:t>10/28/2015</a:t>
             </a:fld>
             <a:endParaRPr lang="en-US"/>
           </a:p>
@@ -2140,6 +2159,7 @@
           <a:p>
             <a:fld id="{E5FBB719-B71D-4C4E-B6FC-9E88D38C766C}" type="slidenum">
               <a:rPr lang="en-US" smtClean="0"/>
+              <a:pPr/>
               <a:t>‹#›</a:t>
             </a:fld>
             <a:endParaRPr lang="en-US"/>
@@ -2149,7 +2169,7 @@
     </p:spTree>
     <p:extLst>
       <p:ext uri="{BB962C8B-B14F-4D97-AF65-F5344CB8AC3E}">
-        <p14:creationId xmlns:p14="http://schemas.microsoft.com/office/powerpoint/2010/main" val="3726652642"/>
+        <p14:creationId xmlns:p14="http://schemas.microsoft.com/office/powerpoint/2010/main" xmlns="" val="3726652642"/>
       </p:ext>
     </p:extLst>
   </p:cSld>
@@ -2351,7 +2371,8 @@
           <a:p>
             <a:fld id="{BA2168AF-9664-40AD-BDE2-4452FE7BA3C6}" type="datetimeFigureOut">
               <a:rPr lang="en-US" smtClean="0"/>
-              <a:t>9/29/2015</a:t>
+              <a:pPr/>
+              <a:t>10/28/2015</a:t>
             </a:fld>
             <a:endParaRPr lang="en-US"/>
           </a:p>
@@ -2393,6 +2414,7 @@
           <a:p>
             <a:fld id="{E5FBB719-B71D-4C4E-B6FC-9E88D38C766C}" type="slidenum">
               <a:rPr lang="en-US" smtClean="0"/>
+              <a:pPr/>
               <a:t>‹#›</a:t>
             </a:fld>
             <a:endParaRPr lang="en-US"/>
@@ -2402,7 +2424,7 @@
     </p:spTree>
     <p:extLst>
       <p:ext uri="{BB962C8B-B14F-4D97-AF65-F5344CB8AC3E}">
-        <p14:creationId xmlns:p14="http://schemas.microsoft.com/office/powerpoint/2010/main" val="3199014227"/>
+        <p14:creationId xmlns:p14="http://schemas.microsoft.com/office/powerpoint/2010/main" xmlns="" val="3199014227"/>
       </p:ext>
     </p:extLst>
   </p:cSld>
@@ -2564,7 +2586,8 @@
           <a:p>
             <a:fld id="{BA2168AF-9664-40AD-BDE2-4452FE7BA3C6}" type="datetimeFigureOut">
               <a:rPr lang="en-US" smtClean="0"/>
-              <a:t>9/29/2015</a:t>
+              <a:pPr/>
+              <a:t>10/28/2015</a:t>
             </a:fld>
             <a:endParaRPr lang="en-US"/>
           </a:p>
@@ -2642,6 +2665,7 @@
           <a:p>
             <a:fld id="{E5FBB719-B71D-4C4E-B6FC-9E88D38C766C}" type="slidenum">
               <a:rPr lang="en-US" smtClean="0"/>
+              <a:pPr/>
               <a:t>‹#›</a:t>
             </a:fld>
             <a:endParaRPr lang="en-US"/>
@@ -2651,7 +2675,7 @@
     </p:spTree>
     <p:extLst>
       <p:ext uri="{BB962C8B-B14F-4D97-AF65-F5344CB8AC3E}">
-        <p14:creationId xmlns:p14="http://schemas.microsoft.com/office/powerpoint/2010/main" val="2777158957"/>
+        <p14:creationId xmlns:p14="http://schemas.microsoft.com/office/powerpoint/2010/main" xmlns="" val="2777158957"/>
       </p:ext>
     </p:extLst>
   </p:cSld>
@@ -3089,7 +3113,7 @@
     </p:spTree>
     <p:extLst>
       <p:ext uri="{BB962C8B-B14F-4D97-AF65-F5344CB8AC3E}">
-        <p14:creationId xmlns:p14="http://schemas.microsoft.com/office/powerpoint/2010/main" val="3444823396"/>
+        <p14:creationId xmlns:p14="http://schemas.microsoft.com/office/powerpoint/2010/main" xmlns="" val="3444823396"/>
       </p:ext>
     </p:extLst>
   </p:cSld>
@@ -3258,11 +3282,7 @@
             </a:r>
             <a:r>
               <a:rPr lang="en-US" dirty="0" smtClean="0"/>
-              <a:t> 1 </a:t>
-            </a:r>
-            <a:r>
-              <a:rPr lang="en-US" dirty="0" smtClean="0"/>
-              <a:t>Table</a:t>
+              <a:t> 1 Table</a:t>
             </a:r>
           </a:p>
           <a:p>
@@ -3363,7 +3383,6 @@
               <a:rPr lang="en-US" dirty="0" smtClean="0"/>
               <a:t> 1 Order</a:t>
             </a:r>
-            <a:endParaRPr lang="en-US" dirty="0" smtClean="0"/>
           </a:p>
           <a:p>
             <a:pPr marL="342900" indent="-342900" algn="l">
@@ -3411,11 +3430,7 @@
             </a:r>
             <a:r>
               <a:rPr lang="en-US" dirty="0" smtClean="0"/>
-              <a:t> 1 </a:t>
-            </a:r>
-            <a:r>
-              <a:rPr lang="en-US" dirty="0" smtClean="0"/>
-              <a:t>Food</a:t>
+              <a:t> 1 Food</a:t>
             </a:r>
           </a:p>
           <a:p>
@@ -3443,7 +3458,6 @@
               <a:rPr lang="en-US" dirty="0" smtClean="0"/>
               <a:t> 1 Category</a:t>
             </a:r>
-            <a:endParaRPr lang="en-US" dirty="0" smtClean="0"/>
           </a:p>
           <a:p>
             <a:pPr marL="342900" indent="-342900" algn="l">
@@ -3503,7 +3517,7 @@
     </p:spTree>
     <p:extLst>
       <p:ext uri="{BB962C8B-B14F-4D97-AF65-F5344CB8AC3E}">
-        <p14:creationId xmlns:p14="http://schemas.microsoft.com/office/powerpoint/2010/main" val="950053622"/>
+        <p14:creationId xmlns:p14="http://schemas.microsoft.com/office/powerpoint/2010/main" xmlns="" val="950053622"/>
       </p:ext>
     </p:extLst>
   </p:cSld>
@@ -4065,7 +4079,6 @@
               <a:rPr lang="en-US" dirty="0"/>
               <a:t>1</a:t>
             </a:r>
-            <a:endParaRPr lang="en-US" dirty="0"/>
           </a:p>
         </p:txBody>
       </p:sp>
@@ -4095,7 +4108,6 @@
               <a:rPr lang="en-US" dirty="0"/>
               <a:t>1</a:t>
             </a:r>
-            <a:endParaRPr lang="en-US" dirty="0"/>
           </a:p>
         </p:txBody>
       </p:sp>
@@ -4272,7 +4284,7 @@
     </p:spTree>
     <p:extLst>
       <p:ext uri="{BB962C8B-B14F-4D97-AF65-F5344CB8AC3E}">
-        <p14:creationId xmlns:p14="http://schemas.microsoft.com/office/powerpoint/2010/main" val="3218817100"/>
+        <p14:creationId xmlns:p14="http://schemas.microsoft.com/office/powerpoint/2010/main" xmlns="" val="3218817100"/>
       </p:ext>
     </p:extLst>
   </p:cSld>
@@ -4379,7 +4391,7 @@
           <p:nvPr>
             <p:extLst>
               <p:ext uri="{D42A27DB-BD31-4B8C-83A1-F6EECF244321}">
-                <p14:modId xmlns:p14="http://schemas.microsoft.com/office/powerpoint/2010/main" val="1140797409"/>
+                <p14:modId xmlns:p14="http://schemas.microsoft.com/office/powerpoint/2010/main" xmlns="" val="1140797409"/>
               </p:ext>
             </p:extLst>
           </p:nvPr>
@@ -4632,14 +4644,14 @@
           <p:nvPr>
             <p:extLst>
               <p:ext uri="{D42A27DB-BD31-4B8C-83A1-F6EECF244321}">
-                <p14:modId xmlns:p14="http://schemas.microsoft.com/office/powerpoint/2010/main" val="1063283922"/>
+                <p14:modId xmlns:p14="http://schemas.microsoft.com/office/powerpoint/2010/main" xmlns="" val="1063283922"/>
               </p:ext>
             </p:extLst>
           </p:nvPr>
         </p:nvGraphicFramePr>
         <p:xfrm>
           <a:off x="1465329" y="4196962"/>
-          <a:ext cx="8127999" cy="1854200"/>
+          <a:ext cx="8127999" cy="2123440"/>
         </p:xfrm>
         <a:graphic>
           <a:graphicData uri="http://schemas.openxmlformats.org/drawingml/2006/table">
@@ -4838,29 +4850,31 @@
                     <a:p>
                       <a:r>
                         <a:rPr lang="en-US" dirty="0" smtClean="0"/>
-                        <a:t>{</a:t>
-                      </a:r>
-                      <a:r>
-                        <a:rPr lang="en-US" dirty="0" err="1" smtClean="0"/>
-                        <a:t>ObjecId</a:t>
-                      </a:r>
-                      <a:r>
-                        <a:rPr lang="en-US" dirty="0" smtClean="0"/>
-                        <a:t>, …}</a:t>
-                      </a:r>
-                      <a:endParaRPr lang="en-US" dirty="0"/>
-                    </a:p>
-                  </a:txBody>
-                  <a:tcPr/>
-                </a:tc>
-                <a:tc>
-                  <a:txBody>
-                    <a:bodyPr/>
-                    <a:lstStyle/>
-                    <a:p>
-                      <a:r>
-                        <a:rPr lang="en-US" dirty="0" smtClean="0"/>
-                        <a:t>List of tables in the floor</a:t>
+                        <a:t>String</a:t>
+                      </a:r>
+                      <a:endParaRPr lang="en-US" dirty="0"/>
+                    </a:p>
+                  </a:txBody>
+                  <a:tcPr/>
+                </a:tc>
+                <a:tc>
+                  <a:txBody>
+                    <a:bodyPr/>
+                    <a:lstStyle/>
+                    <a:p>
+                      <a:r>
+                        <a:rPr lang="en-US" dirty="0" smtClean="0"/>
+                        <a:t>List of tables in the </a:t>
+                      </a:r>
+                      <a:r>
+                        <a:rPr lang="en-US" dirty="0" smtClean="0"/>
+                        <a:t>floor</a:t>
+                      </a:r>
+                    </a:p>
+                    <a:p>
+                      <a:r>
+                        <a:rPr lang="en-US" dirty="0" smtClean="0"/>
+                        <a:t>[Id1, Id2,….]</a:t>
                       </a:r>
                       <a:endParaRPr lang="en-US" dirty="0"/>
                     </a:p>
@@ -4875,7 +4889,7 @@
     </p:spTree>
     <p:extLst>
       <p:ext uri="{BB962C8B-B14F-4D97-AF65-F5344CB8AC3E}">
-        <p14:creationId xmlns:p14="http://schemas.microsoft.com/office/powerpoint/2010/main" val="554012874"/>
+        <p14:creationId xmlns:p14="http://schemas.microsoft.com/office/powerpoint/2010/main" xmlns="" val="554012874"/>
       </p:ext>
     </p:extLst>
   </p:cSld>
@@ -4982,7 +4996,7 @@
           <p:nvPr>
             <p:extLst>
               <p:ext uri="{D42A27DB-BD31-4B8C-83A1-F6EECF244321}">
-                <p14:modId xmlns:p14="http://schemas.microsoft.com/office/powerpoint/2010/main" val="377535283"/>
+                <p14:modId xmlns:p14="http://schemas.microsoft.com/office/powerpoint/2010/main" xmlns="" val="377535283"/>
               </p:ext>
             </p:extLst>
           </p:nvPr>
@@ -5138,7 +5152,7 @@
                     <a:p>
                       <a:r>
                         <a:rPr lang="en-US" dirty="0" smtClean="0"/>
-                        <a:t>Name</a:t>
+                        <a:t>Number</a:t>
                       </a:r>
                       <a:endParaRPr lang="en-US" dirty="0"/>
                     </a:p>
@@ -5223,14 +5237,14 @@
           <p:nvPr>
             <p:extLst>
               <p:ext uri="{D42A27DB-BD31-4B8C-83A1-F6EECF244321}">
-                <p14:modId xmlns:p14="http://schemas.microsoft.com/office/powerpoint/2010/main" val="736504031"/>
+                <p14:modId xmlns:p14="http://schemas.microsoft.com/office/powerpoint/2010/main" xmlns="" val="736504031"/>
               </p:ext>
             </p:extLst>
           </p:nvPr>
         </p:nvGraphicFramePr>
         <p:xfrm>
           <a:off x="1465329" y="4196962"/>
-          <a:ext cx="8127999" cy="2123440"/>
+          <a:ext cx="8127999" cy="2397760"/>
         </p:xfrm>
         <a:graphic>
           <a:graphicData uri="http://schemas.openxmlformats.org/drawingml/2006/table">
@@ -5375,7 +5389,7 @@
                     <a:p>
                       <a:r>
                         <a:rPr lang="en-US" dirty="0" smtClean="0"/>
-                        <a:t>Name</a:t>
+                        <a:t>Number</a:t>
                       </a:r>
                       <a:endParaRPr lang="en-US" dirty="0"/>
                     </a:p>
@@ -5429,15 +5443,7 @@
                     <a:p>
                       <a:r>
                         <a:rPr lang="en-US" dirty="0" smtClean="0"/>
-                        <a:t>{</a:t>
-                      </a:r>
-                      <a:r>
-                        <a:rPr lang="en-US" dirty="0" err="1" smtClean="0"/>
-                        <a:t>ObjectId</a:t>
-                      </a:r>
-                      <a:r>
-                        <a:rPr lang="en-US" dirty="0" smtClean="0"/>
-                        <a:t>, …}</a:t>
+                        <a:t>String</a:t>
                       </a:r>
                       <a:endParaRPr lang="en-US" dirty="0"/>
                     </a:p>
@@ -5455,7 +5461,17 @@
                       </a:r>
                       <a:r>
                         <a:rPr lang="en-US" baseline="0" dirty="0" smtClean="0"/>
-                        <a:t> in the category</a:t>
+                        <a:t> in the </a:t>
+                      </a:r>
+                      <a:r>
+                        <a:rPr lang="en-US" baseline="0" dirty="0" smtClean="0"/>
+                        <a:t>category</a:t>
+                      </a:r>
+                    </a:p>
+                    <a:p>
+                      <a:r>
+                        <a:rPr lang="en-US" dirty="0" smtClean="0"/>
+                        <a:t>[Id1, Id2,….]</a:t>
                       </a:r>
                       <a:endParaRPr lang="en-US" dirty="0"/>
                     </a:p>
@@ -5470,7 +5486,7 @@
     </p:spTree>
     <p:extLst>
       <p:ext uri="{BB962C8B-B14F-4D97-AF65-F5344CB8AC3E}">
-        <p14:creationId xmlns:p14="http://schemas.microsoft.com/office/powerpoint/2010/main" val="3710841385"/>
+        <p14:creationId xmlns:p14="http://schemas.microsoft.com/office/powerpoint/2010/main" xmlns="" val="3710841385"/>
       </p:ext>
     </p:extLst>
   </p:cSld>
@@ -5561,6 +5577,10 @@
           </a:p>
           <a:p>
             <a:pPr algn="l"/>
+            <a:endParaRPr lang="en-US" dirty="0" smtClean="0"/>
+          </a:p>
+          <a:p>
+            <a:pPr algn="l"/>
             <a:r>
               <a:rPr lang="en-US" dirty="0" err="1" smtClean="0"/>
               <a:t>Bảng</a:t>
@@ -5610,14 +5630,14 @@
           <p:nvPr>
             <p:extLst>
               <p:ext uri="{D42A27DB-BD31-4B8C-83A1-F6EECF244321}">
-                <p14:modId xmlns:p14="http://schemas.microsoft.com/office/powerpoint/2010/main" val="2320792388"/>
+                <p14:modId xmlns:p14="http://schemas.microsoft.com/office/powerpoint/2010/main" xmlns="" val="2320792388"/>
               </p:ext>
             </p:extLst>
           </p:nvPr>
         </p:nvGraphicFramePr>
         <p:xfrm>
           <a:off x="2212304" y="281785"/>
-          <a:ext cx="8850648" cy="3876040"/>
+          <a:ext cx="8850648" cy="4516120"/>
         </p:xfrm>
         <a:graphic>
           <a:graphicData uri="http://schemas.openxmlformats.org/drawingml/2006/table">
@@ -5736,37 +5756,31 @@
                     <a:p>
                       <a:r>
                         <a:rPr lang="en-US" dirty="0" smtClean="0"/>
-                        <a:t>{</a:t>
-                      </a:r>
-                      <a:r>
-                        <a:rPr lang="en-US" dirty="0" err="1" smtClean="0"/>
-                        <a:t>ObjectId</a:t>
-                      </a:r>
-                      <a:r>
-                        <a:rPr lang="en-US" dirty="0" smtClean="0"/>
-                        <a:t>,</a:t>
-                      </a:r>
-                      <a:r>
-                        <a:rPr lang="en-US" baseline="0" dirty="0" smtClean="0"/>
-                        <a:t> …</a:t>
-                      </a:r>
-                      <a:r>
-                        <a:rPr lang="en-US" dirty="0" smtClean="0"/>
-                        <a:t>}</a:t>
-                      </a:r>
-                      <a:endParaRPr lang="en-US" dirty="0"/>
-                    </a:p>
-                  </a:txBody>
-                  <a:tcPr/>
-                </a:tc>
-                <a:tc>
-                  <a:txBody>
-                    <a:bodyPr/>
-                    <a:lstStyle/>
-                    <a:p>
-                      <a:r>
-                        <a:rPr lang="en-US" dirty="0" smtClean="0"/>
-                        <a:t>List of order details</a:t>
+                        <a:t>String</a:t>
+                      </a:r>
+                      <a:endParaRPr lang="en-US" dirty="0"/>
+                    </a:p>
+                  </a:txBody>
+                  <a:tcPr/>
+                </a:tc>
+                <a:tc>
+                  <a:txBody>
+                    <a:bodyPr/>
+                    <a:lstStyle/>
+                    <a:p>
+                      <a:r>
+                        <a:rPr lang="en-US" dirty="0" smtClean="0"/>
+                        <a:t>List of order </a:t>
+                      </a:r>
+                      <a:r>
+                        <a:rPr lang="en-US" dirty="0" smtClean="0"/>
+                        <a:t>details</a:t>
+                      </a:r>
+                    </a:p>
+                    <a:p>
+                      <a:r>
+                        <a:rPr lang="en-US" dirty="0" smtClean="0"/>
+                        <a:t>[Id1, Id2,….]</a:t>
                       </a:r>
                       <a:endParaRPr lang="en-US" dirty="0"/>
                     </a:p>
@@ -5910,11 +5924,7 @@
                       </a:r>
                       <a:r>
                         <a:rPr lang="en-US" baseline="0" dirty="0" smtClean="0"/>
-                        <a:t> for </a:t>
-                      </a:r>
-                      <a:r>
-                        <a:rPr lang="en-US" baseline="0" dirty="0" smtClean="0"/>
-                        <a:t>foods</a:t>
+                        <a:t> for foods</a:t>
                       </a:r>
                       <a:endParaRPr lang="en-US" dirty="0"/>
                     </a:p>
@@ -5987,8 +5997,8 @@
                     <a:lstStyle/>
                     <a:p>
                       <a:r>
-                        <a:rPr lang="en-US" dirty="0" err="1" smtClean="0"/>
-                        <a:t>ObjectId</a:t>
+                        <a:rPr lang="en-US" dirty="0" smtClean="0"/>
+                        <a:t>String</a:t>
                       </a:r>
                       <a:endParaRPr lang="en-US" dirty="0"/>
                     </a:p>
@@ -6042,9 +6052,52 @@
                     <a:p>
                       <a:r>
                         <a:rPr lang="en-US" dirty="0" smtClean="0"/>
-                        <a:t>Note for special food</a:t>
-                      </a:r>
-                      <a:endParaRPr lang="en-US" dirty="0"/>
+                        <a:t>Note for special </a:t>
+                      </a:r>
+                      <a:r>
+                        <a:rPr lang="en-US" dirty="0" smtClean="0"/>
+                        <a:t>food</a:t>
+                      </a:r>
+                    </a:p>
+                  </a:txBody>
+                  <a:tcPr/>
+                </a:tc>
+              </a:tr>
+              <a:tr h="370840">
+                <a:tc>
+                  <a:txBody>
+                    <a:bodyPr/>
+                    <a:lstStyle/>
+                    <a:p>
+                      <a:r>
+                        <a:rPr lang="en-US" dirty="0" err="1" smtClean="0"/>
+                        <a:t>StaffName</a:t>
+                      </a:r>
+                      <a:endParaRPr lang="en-US" dirty="0"/>
+                    </a:p>
+                  </a:txBody>
+                  <a:tcPr/>
+                </a:tc>
+                <a:tc>
+                  <a:txBody>
+                    <a:bodyPr/>
+                    <a:lstStyle/>
+                    <a:p>
+                      <a:r>
+                        <a:rPr lang="en-US" dirty="0" smtClean="0"/>
+                        <a:t>String</a:t>
+                      </a:r>
+                      <a:endParaRPr lang="en-US" dirty="0"/>
+                    </a:p>
+                  </a:txBody>
+                  <a:tcPr/>
+                </a:tc>
+                <a:tc>
+                  <a:txBody>
+                    <a:bodyPr/>
+                    <a:lstStyle/>
+                    <a:p>
+                      <a:endParaRPr lang="en-US" dirty="0" smtClean="0"/>
                     </a:p>
                   </a:txBody>
                   <a:tcPr/>
@@ -6063,13 +6116,13 @@
           <p:nvPr>
             <p:extLst>
               <p:ext uri="{D42A27DB-BD31-4B8C-83A1-F6EECF244321}">
-                <p14:modId xmlns:p14="http://schemas.microsoft.com/office/powerpoint/2010/main" val="962685609"/>
+                <p14:modId xmlns:p14="http://schemas.microsoft.com/office/powerpoint/2010/main" xmlns="" val="962685609"/>
               </p:ext>
             </p:extLst>
           </p:nvPr>
         </p:nvGraphicFramePr>
         <p:xfrm>
-          <a:off x="2997916" y="4360930"/>
+          <a:off x="3150316" y="4923637"/>
           <a:ext cx="8786253" cy="2387600"/>
         </p:xfrm>
         <a:graphic>
@@ -6188,8 +6241,8 @@
                     <a:lstStyle/>
                     <a:p>
                       <a:r>
-                        <a:rPr lang="en-US" dirty="0" err="1" smtClean="0"/>
-                        <a:t>ObjectId</a:t>
+                        <a:rPr lang="en-US" dirty="0" smtClean="0"/>
+                        <a:t>String</a:t>
                       </a:r>
                       <a:endParaRPr lang="en-US" dirty="0"/>
                     </a:p>
@@ -6314,7 +6367,7 @@
     </p:spTree>
     <p:extLst>
       <p:ext uri="{BB962C8B-B14F-4D97-AF65-F5344CB8AC3E}">
-        <p14:creationId xmlns:p14="http://schemas.microsoft.com/office/powerpoint/2010/main" val="1862284109"/>
+        <p14:creationId xmlns:p14="http://schemas.microsoft.com/office/powerpoint/2010/main" xmlns="" val="1862284109"/>
       </p:ext>
     </p:extLst>
   </p:cSld>
@@ -6367,7 +6420,7 @@
     </a:clrScheme>
     <a:fontScheme name="Office">
       <a:majorFont>
-        <a:latin typeface="Calibri Light" panose="020F0302020204030204"/>
+        <a:latin typeface="Calibri Light"/>
         <a:ea typeface=""/>
         <a:cs typeface=""/>
         <a:font script="Jpan" typeface="ＭＳ Ｐゴシック"/>
@@ -6402,7 +6455,7 @@
         <a:font script="Geor" typeface="Sylfaen"/>
       </a:majorFont>
       <a:minorFont>
-        <a:latin typeface="Calibri" panose="020F0502020204030204"/>
+        <a:latin typeface="Calibri"/>
         <a:ea typeface=""/>
         <a:cs typeface=""/>
         <a:font script="Jpan" typeface="ＭＳ Ｐゴシック"/>
@@ -6579,7 +6632,7 @@
   <a:extraClrSchemeLst/>
   <a:extLst>
     <a:ext uri="{05A4C25C-085E-4340-85A3-A5531E510DB2}">
-      <thm15:themeFamily xmlns:thm15="http://schemas.microsoft.com/office/thememl/2012/main" xmlns="" name="Office Theme" id="{62F939B6-93AF-4DB8-9C6B-D6C7DFDC589F}" vid="{4A3C46E8-61CC-4603-A589-7422A47A8E4A}"/>
+      <thm15:themeFamily xmlns="" xmlns:thm15="http://schemas.microsoft.com/office/thememl/2012/main" name="Office Theme" id="{62F939B6-93AF-4DB8-9C6B-D6C7DFDC589F}" vid="{4A3C46E8-61CC-4603-A589-7422A47A8E4A}"/>
     </a:ext>
   </a:extLst>
 </a:theme>

</xml_diff>

<commit_message>
- Add Configuration management
</commit_message>
<xml_diff>
--- a/Tags/Database/DatabaseDesign_V2.pptx
+++ b/Tags/Database/DatabaseDesign_V2.pptx
@@ -11,6 +11,7 @@
     <p:sldId id="259" r:id="rId5"/>
     <p:sldId id="260" r:id="rId6"/>
     <p:sldId id="261" r:id="rId7"/>
+    <p:sldId id="262" r:id="rId8"/>
   </p:sldIdLst>
   <p:sldSz cx="12192000" cy="6858000"/>
   <p:notesSz cx="6858000" cy="9144000"/>
@@ -244,7 +245,7 @@
             <a:fld id="{BA2168AF-9664-40AD-BDE2-4452FE7BA3C6}" type="datetimeFigureOut">
               <a:rPr lang="en-US" smtClean="0"/>
               <a:pPr/>
-              <a:t>10/28/2015</a:t>
+              <a:t>12/5/2015</a:t>
             </a:fld>
             <a:endParaRPr lang="en-US"/>
           </a:p>
@@ -296,7 +297,7 @@
     </p:spTree>
     <p:extLst>
       <p:ext uri="{BB962C8B-B14F-4D97-AF65-F5344CB8AC3E}">
-        <p14:creationId xmlns:p14="http://schemas.microsoft.com/office/powerpoint/2010/main" xmlns="" val="3813746380"/>
+        <p14:creationId xmlns="" xmlns:p14="http://schemas.microsoft.com/office/powerpoint/2010/main" val="3813746380"/>
       </p:ext>
     </p:extLst>
   </p:cSld>
@@ -416,7 +417,7 @@
             <a:fld id="{BA2168AF-9664-40AD-BDE2-4452FE7BA3C6}" type="datetimeFigureOut">
               <a:rPr lang="en-US" smtClean="0"/>
               <a:pPr/>
-              <a:t>10/28/2015</a:t>
+              <a:t>12/5/2015</a:t>
             </a:fld>
             <a:endParaRPr lang="en-US"/>
           </a:p>
@@ -468,7 +469,7 @@
     </p:spTree>
     <p:extLst>
       <p:ext uri="{BB962C8B-B14F-4D97-AF65-F5344CB8AC3E}">
-        <p14:creationId xmlns:p14="http://schemas.microsoft.com/office/powerpoint/2010/main" xmlns="" val="1978048032"/>
+        <p14:creationId xmlns="" xmlns:p14="http://schemas.microsoft.com/office/powerpoint/2010/main" val="1978048032"/>
       </p:ext>
     </p:extLst>
   </p:cSld>
@@ -598,7 +599,7 @@
             <a:fld id="{BA2168AF-9664-40AD-BDE2-4452FE7BA3C6}" type="datetimeFigureOut">
               <a:rPr lang="en-US" smtClean="0"/>
               <a:pPr/>
-              <a:t>10/28/2015</a:t>
+              <a:t>12/5/2015</a:t>
             </a:fld>
             <a:endParaRPr lang="en-US"/>
           </a:p>
@@ -650,7 +651,7 @@
     </p:spTree>
     <p:extLst>
       <p:ext uri="{BB962C8B-B14F-4D97-AF65-F5344CB8AC3E}">
-        <p14:creationId xmlns:p14="http://schemas.microsoft.com/office/powerpoint/2010/main" xmlns="" val="2105176745"/>
+        <p14:creationId xmlns="" xmlns:p14="http://schemas.microsoft.com/office/powerpoint/2010/main" val="2105176745"/>
       </p:ext>
     </p:extLst>
   </p:cSld>
@@ -770,7 +771,7 @@
             <a:fld id="{BA2168AF-9664-40AD-BDE2-4452FE7BA3C6}" type="datetimeFigureOut">
               <a:rPr lang="en-US" smtClean="0"/>
               <a:pPr/>
-              <a:t>10/28/2015</a:t>
+              <a:t>12/5/2015</a:t>
             </a:fld>
             <a:endParaRPr lang="en-US"/>
           </a:p>
@@ -822,7 +823,7 @@
     </p:spTree>
     <p:extLst>
       <p:ext uri="{BB962C8B-B14F-4D97-AF65-F5344CB8AC3E}">
-        <p14:creationId xmlns:p14="http://schemas.microsoft.com/office/powerpoint/2010/main" xmlns="" val="3237410288"/>
+        <p14:creationId xmlns="" xmlns:p14="http://schemas.microsoft.com/office/powerpoint/2010/main" val="3237410288"/>
       </p:ext>
     </p:extLst>
   </p:cSld>
@@ -1018,7 +1019,7 @@
             <a:fld id="{BA2168AF-9664-40AD-BDE2-4452FE7BA3C6}" type="datetimeFigureOut">
               <a:rPr lang="en-US" smtClean="0"/>
               <a:pPr/>
-              <a:t>10/28/2015</a:t>
+              <a:t>12/5/2015</a:t>
             </a:fld>
             <a:endParaRPr lang="en-US"/>
           </a:p>
@@ -1070,7 +1071,7 @@
     </p:spTree>
     <p:extLst>
       <p:ext uri="{BB962C8B-B14F-4D97-AF65-F5344CB8AC3E}">
-        <p14:creationId xmlns:p14="http://schemas.microsoft.com/office/powerpoint/2010/main" xmlns="" val="4019724857"/>
+        <p14:creationId xmlns="" xmlns:p14="http://schemas.microsoft.com/office/powerpoint/2010/main" val="4019724857"/>
       </p:ext>
     </p:extLst>
   </p:cSld>
@@ -1252,7 +1253,7 @@
             <a:fld id="{BA2168AF-9664-40AD-BDE2-4452FE7BA3C6}" type="datetimeFigureOut">
               <a:rPr lang="en-US" smtClean="0"/>
               <a:pPr/>
-              <a:t>10/28/2015</a:t>
+              <a:t>12/5/2015</a:t>
             </a:fld>
             <a:endParaRPr lang="en-US"/>
           </a:p>
@@ -1304,7 +1305,7 @@
     </p:spTree>
     <p:extLst>
       <p:ext uri="{BB962C8B-B14F-4D97-AF65-F5344CB8AC3E}">
-        <p14:creationId xmlns:p14="http://schemas.microsoft.com/office/powerpoint/2010/main" xmlns="" val="3357370416"/>
+        <p14:creationId xmlns="" xmlns:p14="http://schemas.microsoft.com/office/powerpoint/2010/main" val="3357370416"/>
       </p:ext>
     </p:extLst>
   </p:cSld>
@@ -1621,7 +1622,7 @@
             <a:fld id="{BA2168AF-9664-40AD-BDE2-4452FE7BA3C6}" type="datetimeFigureOut">
               <a:rPr lang="en-US" smtClean="0"/>
               <a:pPr/>
-              <a:t>10/28/2015</a:t>
+              <a:t>12/5/2015</a:t>
             </a:fld>
             <a:endParaRPr lang="en-US"/>
           </a:p>
@@ -1673,7 +1674,7 @@
     </p:spTree>
     <p:extLst>
       <p:ext uri="{BB962C8B-B14F-4D97-AF65-F5344CB8AC3E}">
-        <p14:creationId xmlns:p14="http://schemas.microsoft.com/office/powerpoint/2010/main" xmlns="" val="4186753810"/>
+        <p14:creationId xmlns="" xmlns:p14="http://schemas.microsoft.com/office/powerpoint/2010/main" val="4186753810"/>
       </p:ext>
     </p:extLst>
   </p:cSld>
@@ -1741,7 +1742,7 @@
             <a:fld id="{BA2168AF-9664-40AD-BDE2-4452FE7BA3C6}" type="datetimeFigureOut">
               <a:rPr lang="en-US" smtClean="0"/>
               <a:pPr/>
-              <a:t>10/28/2015</a:t>
+              <a:t>12/5/2015</a:t>
             </a:fld>
             <a:endParaRPr lang="en-US"/>
           </a:p>
@@ -1793,7 +1794,7 @@
     </p:spTree>
     <p:extLst>
       <p:ext uri="{BB962C8B-B14F-4D97-AF65-F5344CB8AC3E}">
-        <p14:creationId xmlns:p14="http://schemas.microsoft.com/office/powerpoint/2010/main" xmlns="" val="1915232082"/>
+        <p14:creationId xmlns="" xmlns:p14="http://schemas.microsoft.com/office/powerpoint/2010/main" val="1915232082"/>
       </p:ext>
     </p:extLst>
   </p:cSld>
@@ -1838,7 +1839,7 @@
             <a:fld id="{BA2168AF-9664-40AD-BDE2-4452FE7BA3C6}" type="datetimeFigureOut">
               <a:rPr lang="en-US" smtClean="0"/>
               <a:pPr/>
-              <a:t>10/28/2015</a:t>
+              <a:t>12/5/2015</a:t>
             </a:fld>
             <a:endParaRPr lang="en-US"/>
           </a:p>
@@ -1890,7 +1891,7 @@
     </p:spTree>
     <p:extLst>
       <p:ext uri="{BB962C8B-B14F-4D97-AF65-F5344CB8AC3E}">
-        <p14:creationId xmlns:p14="http://schemas.microsoft.com/office/powerpoint/2010/main" xmlns="" val="891009138"/>
+        <p14:creationId xmlns="" xmlns:p14="http://schemas.microsoft.com/office/powerpoint/2010/main" val="891009138"/>
       </p:ext>
     </p:extLst>
   </p:cSld>
@@ -2117,7 +2118,7 @@
             <a:fld id="{BA2168AF-9664-40AD-BDE2-4452FE7BA3C6}" type="datetimeFigureOut">
               <a:rPr lang="en-US" smtClean="0"/>
               <a:pPr/>
-              <a:t>10/28/2015</a:t>
+              <a:t>12/5/2015</a:t>
             </a:fld>
             <a:endParaRPr lang="en-US"/>
           </a:p>
@@ -2169,7 +2170,7 @@
     </p:spTree>
     <p:extLst>
       <p:ext uri="{BB962C8B-B14F-4D97-AF65-F5344CB8AC3E}">
-        <p14:creationId xmlns:p14="http://schemas.microsoft.com/office/powerpoint/2010/main" xmlns="" val="3726652642"/>
+        <p14:creationId xmlns="" xmlns:p14="http://schemas.microsoft.com/office/powerpoint/2010/main" val="3726652642"/>
       </p:ext>
     </p:extLst>
   </p:cSld>
@@ -2372,7 +2373,7 @@
             <a:fld id="{BA2168AF-9664-40AD-BDE2-4452FE7BA3C6}" type="datetimeFigureOut">
               <a:rPr lang="en-US" smtClean="0"/>
               <a:pPr/>
-              <a:t>10/28/2015</a:t>
+              <a:t>12/5/2015</a:t>
             </a:fld>
             <a:endParaRPr lang="en-US"/>
           </a:p>
@@ -2424,7 +2425,7 @@
     </p:spTree>
     <p:extLst>
       <p:ext uri="{BB962C8B-B14F-4D97-AF65-F5344CB8AC3E}">
-        <p14:creationId xmlns:p14="http://schemas.microsoft.com/office/powerpoint/2010/main" xmlns="" val="3199014227"/>
+        <p14:creationId xmlns="" xmlns:p14="http://schemas.microsoft.com/office/powerpoint/2010/main" val="3199014227"/>
       </p:ext>
     </p:extLst>
   </p:cSld>
@@ -2587,7 +2588,7 @@
             <a:fld id="{BA2168AF-9664-40AD-BDE2-4452FE7BA3C6}" type="datetimeFigureOut">
               <a:rPr lang="en-US" smtClean="0"/>
               <a:pPr/>
-              <a:t>10/28/2015</a:t>
+              <a:t>12/5/2015</a:t>
             </a:fld>
             <a:endParaRPr lang="en-US"/>
           </a:p>
@@ -2675,7 +2676,7 @@
     </p:spTree>
     <p:extLst>
       <p:ext uri="{BB962C8B-B14F-4D97-AF65-F5344CB8AC3E}">
-        <p14:creationId xmlns:p14="http://schemas.microsoft.com/office/powerpoint/2010/main" xmlns="" val="2777158957"/>
+        <p14:creationId xmlns="" xmlns:p14="http://schemas.microsoft.com/office/powerpoint/2010/main" val="2777158957"/>
       </p:ext>
     </p:extLst>
   </p:cSld>
@@ -3104,7 +3105,7 @@
             </a:pPr>
             <a:r>
               <a:rPr lang="en-US" dirty="0" smtClean="0"/>
-              <a:t>Manager</a:t>
+              <a:t>Configuration</a:t>
             </a:r>
             <a:endParaRPr lang="en-US" dirty="0"/>
           </a:p>
@@ -3113,7 +3114,7 @@
     </p:spTree>
     <p:extLst>
       <p:ext uri="{BB962C8B-B14F-4D97-AF65-F5344CB8AC3E}">
-        <p14:creationId xmlns:p14="http://schemas.microsoft.com/office/powerpoint/2010/main" xmlns="" val="3444823396"/>
+        <p14:creationId xmlns="" xmlns:p14="http://schemas.microsoft.com/office/powerpoint/2010/main" val="3444823396"/>
       </p:ext>
     </p:extLst>
   </p:cSld>
@@ -3517,7 +3518,7 @@
     </p:spTree>
     <p:extLst>
       <p:ext uri="{BB962C8B-B14F-4D97-AF65-F5344CB8AC3E}">
-        <p14:creationId xmlns:p14="http://schemas.microsoft.com/office/powerpoint/2010/main" xmlns="" val="950053622"/>
+        <p14:creationId xmlns="" xmlns:p14="http://schemas.microsoft.com/office/powerpoint/2010/main" val="950053622"/>
       </p:ext>
     </p:extLst>
   </p:cSld>
@@ -4284,7 +4285,7 @@
     </p:spTree>
     <p:extLst>
       <p:ext uri="{BB962C8B-B14F-4D97-AF65-F5344CB8AC3E}">
-        <p14:creationId xmlns:p14="http://schemas.microsoft.com/office/powerpoint/2010/main" xmlns="" val="3218817100"/>
+        <p14:creationId xmlns="" xmlns:p14="http://schemas.microsoft.com/office/powerpoint/2010/main" val="3218817100"/>
       </p:ext>
     </p:extLst>
   </p:cSld>
@@ -4391,7 +4392,7 @@
           <p:nvPr>
             <p:extLst>
               <p:ext uri="{D42A27DB-BD31-4B8C-83A1-F6EECF244321}">
-                <p14:modId xmlns:p14="http://schemas.microsoft.com/office/powerpoint/2010/main" xmlns="" val="1140797409"/>
+                <p14:modId xmlns="" xmlns:p14="http://schemas.microsoft.com/office/powerpoint/2010/main" val="1140797409"/>
               </p:ext>
             </p:extLst>
           </p:nvPr>
@@ -4644,7 +4645,7 @@
           <p:nvPr>
             <p:extLst>
               <p:ext uri="{D42A27DB-BD31-4B8C-83A1-F6EECF244321}">
-                <p14:modId xmlns:p14="http://schemas.microsoft.com/office/powerpoint/2010/main" xmlns="" val="1063283922"/>
+                <p14:modId xmlns="" xmlns:p14="http://schemas.microsoft.com/office/powerpoint/2010/main" val="1063283922"/>
               </p:ext>
             </p:extLst>
           </p:nvPr>
@@ -4864,11 +4865,7 @@
                     <a:p>
                       <a:r>
                         <a:rPr lang="en-US" dirty="0" smtClean="0"/>
-                        <a:t>List of tables in the </a:t>
-                      </a:r>
-                      <a:r>
-                        <a:rPr lang="en-US" dirty="0" smtClean="0"/>
-                        <a:t>floor</a:t>
+                        <a:t>List of tables in the floor</a:t>
                       </a:r>
                     </a:p>
                     <a:p>
@@ -4889,7 +4886,7 @@
     </p:spTree>
     <p:extLst>
       <p:ext uri="{BB962C8B-B14F-4D97-AF65-F5344CB8AC3E}">
-        <p14:creationId xmlns:p14="http://schemas.microsoft.com/office/powerpoint/2010/main" xmlns="" val="554012874"/>
+        <p14:creationId xmlns="" xmlns:p14="http://schemas.microsoft.com/office/powerpoint/2010/main" val="554012874"/>
       </p:ext>
     </p:extLst>
   </p:cSld>
@@ -4996,7 +4993,7 @@
           <p:nvPr>
             <p:extLst>
               <p:ext uri="{D42A27DB-BD31-4B8C-83A1-F6EECF244321}">
-                <p14:modId xmlns:p14="http://schemas.microsoft.com/office/powerpoint/2010/main" xmlns="" val="377535283"/>
+                <p14:modId xmlns="" xmlns:p14="http://schemas.microsoft.com/office/powerpoint/2010/main" val="377535283"/>
               </p:ext>
             </p:extLst>
           </p:nvPr>
@@ -5237,7 +5234,7 @@
           <p:nvPr>
             <p:extLst>
               <p:ext uri="{D42A27DB-BD31-4B8C-83A1-F6EECF244321}">
-                <p14:modId xmlns:p14="http://schemas.microsoft.com/office/powerpoint/2010/main" xmlns="" val="736504031"/>
+                <p14:modId xmlns="" xmlns:p14="http://schemas.microsoft.com/office/powerpoint/2010/main" val="736504031"/>
               </p:ext>
             </p:extLst>
           </p:nvPr>
@@ -5461,11 +5458,7 @@
                       </a:r>
                       <a:r>
                         <a:rPr lang="en-US" baseline="0" dirty="0" smtClean="0"/>
-                        <a:t> in the </a:t>
-                      </a:r>
-                      <a:r>
-                        <a:rPr lang="en-US" baseline="0" dirty="0" smtClean="0"/>
-                        <a:t>category</a:t>
+                        <a:t> in the category</a:t>
                       </a:r>
                     </a:p>
                     <a:p>
@@ -5486,7 +5479,7 @@
     </p:spTree>
     <p:extLst>
       <p:ext uri="{BB962C8B-B14F-4D97-AF65-F5344CB8AC3E}">
-        <p14:creationId xmlns:p14="http://schemas.microsoft.com/office/powerpoint/2010/main" xmlns="" val="3710841385"/>
+        <p14:creationId xmlns="" xmlns:p14="http://schemas.microsoft.com/office/powerpoint/2010/main" val="3710841385"/>
       </p:ext>
     </p:extLst>
   </p:cSld>
@@ -5605,6 +5598,14 @@
           </a:p>
           <a:p>
             <a:pPr algn="l"/>
+            <a:endParaRPr lang="en-US" dirty="0" smtClean="0"/>
+          </a:p>
+          <a:p>
+            <a:pPr algn="l"/>
+            <a:endParaRPr lang="en-US" dirty="0" smtClean="0"/>
+          </a:p>
+          <a:p>
+            <a:pPr algn="l"/>
             <a:endParaRPr lang="en-US" dirty="0"/>
           </a:p>
           <a:p>
@@ -5630,7 +5631,7 @@
           <p:nvPr>
             <p:extLst>
               <p:ext uri="{D42A27DB-BD31-4B8C-83A1-F6EECF244321}">
-                <p14:modId xmlns:p14="http://schemas.microsoft.com/office/powerpoint/2010/main" xmlns="" val="2320792388"/>
+                <p14:modId xmlns="" xmlns:p14="http://schemas.microsoft.com/office/powerpoint/2010/main" val="2320792388"/>
               </p:ext>
             </p:extLst>
           </p:nvPr>
@@ -5770,11 +5771,7 @@
                     <a:p>
                       <a:r>
                         <a:rPr lang="en-US" dirty="0" smtClean="0"/>
-                        <a:t>List of order </a:t>
-                      </a:r>
-                      <a:r>
-                        <a:rPr lang="en-US" dirty="0" smtClean="0"/>
-                        <a:t>details</a:t>
+                        <a:t>List of order details</a:t>
                       </a:r>
                     </a:p>
                     <a:p>
@@ -6052,11 +6049,7 @@
                     <a:p>
                       <a:r>
                         <a:rPr lang="en-US" dirty="0" smtClean="0"/>
-                        <a:t>Note for special </a:t>
-                      </a:r>
-                      <a:r>
-                        <a:rPr lang="en-US" dirty="0" smtClean="0"/>
-                        <a:t>food</a:t>
+                        <a:t>Note for special food</a:t>
                       </a:r>
                     </a:p>
                   </a:txBody>
@@ -6116,7 +6109,7 @@
           <p:nvPr>
             <p:extLst>
               <p:ext uri="{D42A27DB-BD31-4B8C-83A1-F6EECF244321}">
-                <p14:modId xmlns:p14="http://schemas.microsoft.com/office/powerpoint/2010/main" xmlns="" val="962685609"/>
+                <p14:modId xmlns="" xmlns:p14="http://schemas.microsoft.com/office/powerpoint/2010/main" val="962685609"/>
               </p:ext>
             </p:extLst>
           </p:nvPr>
@@ -6367,9 +6360,285 @@
     </p:spTree>
     <p:extLst>
       <p:ext uri="{BB962C8B-B14F-4D97-AF65-F5344CB8AC3E}">
-        <p14:creationId xmlns:p14="http://schemas.microsoft.com/office/powerpoint/2010/main" xmlns="" val="1862284109"/>
+        <p14:creationId xmlns="" xmlns:p14="http://schemas.microsoft.com/office/powerpoint/2010/main" val="1862284109"/>
       </p:ext>
     </p:extLst>
+  </p:cSld>
+  <p:clrMapOvr>
+    <a:masterClrMapping/>
+  </p:clrMapOvr>
+</p:sld>
+</file>
+
+<file path=ppt/slides/slide7.xml><?xml version="1.0" encoding="utf-8"?>
+<p:sld xmlns:a="http://schemas.openxmlformats.org/drawingml/2006/main" xmlns:r="http://schemas.openxmlformats.org/officeDocument/2006/relationships" xmlns:p="http://schemas.openxmlformats.org/presentationml/2006/main">
+  <p:cSld>
+    <p:spTree>
+      <p:nvGrpSpPr>
+        <p:cNvPr id="1" name=""/>
+        <p:cNvGrpSpPr/>
+        <p:nvPr/>
+      </p:nvGrpSpPr>
+      <p:grpSpPr>
+        <a:xfrm>
+          <a:off x="0" y="0"/>
+          <a:ext cx="0" cy="0"/>
+          <a:chOff x="0" y="0"/>
+          <a:chExt cx="0" cy="0"/>
+        </a:xfrm>
+      </p:grpSpPr>
+      <p:sp>
+        <p:nvSpPr>
+          <p:cNvPr id="3" name="Content Placeholder 2"/>
+          <p:cNvSpPr>
+            <a:spLocks noGrp="1"/>
+          </p:cNvSpPr>
+          <p:nvPr>
+            <p:ph idx="1"/>
+          </p:nvPr>
+        </p:nvSpPr>
+        <p:spPr>
+          <a:xfrm>
+            <a:off x="838200" y="539262"/>
+            <a:ext cx="10515600" cy="5637701"/>
+          </a:xfrm>
+        </p:spPr>
+        <p:txBody>
+          <a:bodyPr/>
+          <a:lstStyle/>
+          <a:p>
+            <a:r>
+              <a:rPr lang="en-US" dirty="0" smtClean="0"/>
+              <a:t>Configuration</a:t>
+            </a:r>
+          </a:p>
+          <a:p>
+            <a:endParaRPr lang="en-US" dirty="0"/>
+          </a:p>
+        </p:txBody>
+      </p:sp>
+      <p:graphicFrame>
+        <p:nvGraphicFramePr>
+          <p:cNvPr id="4" name="Table 3"/>
+          <p:cNvGraphicFramePr>
+            <a:graphicFrameLocks noGrp="1"/>
+          </p:cNvGraphicFramePr>
+          <p:nvPr>
+            <p:extLst>
+              <p:ext uri="{D42A27DB-BD31-4B8C-83A1-F6EECF244321}">
+                <p14:modId xmlns="" xmlns:p14="http://schemas.microsoft.com/office/powerpoint/2010/main" val="962685609"/>
+              </p:ext>
+            </p:extLst>
+          </p:nvPr>
+        </p:nvGraphicFramePr>
+        <p:xfrm>
+          <a:off x="1450469" y="1336375"/>
+          <a:ext cx="8786253" cy="1747520"/>
+        </p:xfrm>
+        <a:graphic>
+          <a:graphicData uri="http://schemas.openxmlformats.org/drawingml/2006/table">
+            <a:tbl>
+              <a:tblPr firstRow="1" bandRow="1">
+                <a:tableStyleId>{5C22544A-7EE6-4342-B048-85BDC9FD1C3A}</a:tableStyleId>
+              </a:tblPr>
+              <a:tblGrid>
+                <a:gridCol w="1805904"/>
+                <a:gridCol w="3593206"/>
+                <a:gridCol w="3387143"/>
+              </a:tblGrid>
+              <a:tr h="356409">
+                <a:tc>
+                  <a:txBody>
+                    <a:bodyPr/>
+                    <a:lstStyle/>
+                    <a:p>
+                      <a:r>
+                        <a:rPr lang="en-US" dirty="0" smtClean="0"/>
+                        <a:t>Name</a:t>
+                      </a:r>
+                      <a:endParaRPr lang="en-US" dirty="0"/>
+                    </a:p>
+                  </a:txBody>
+                  <a:tcPr/>
+                </a:tc>
+                <a:tc>
+                  <a:txBody>
+                    <a:bodyPr/>
+                    <a:lstStyle/>
+                    <a:p>
+                      <a:r>
+                        <a:rPr lang="en-US" dirty="0" smtClean="0"/>
+                        <a:t>Type</a:t>
+                      </a:r>
+                      <a:endParaRPr lang="en-US" dirty="0"/>
+                    </a:p>
+                  </a:txBody>
+                  <a:tcPr/>
+                </a:tc>
+                <a:tc>
+                  <a:txBody>
+                    <a:bodyPr/>
+                    <a:lstStyle/>
+                    <a:p>
+                      <a:r>
+                        <a:rPr lang="en-US" dirty="0" smtClean="0"/>
+                        <a:t>Note</a:t>
+                      </a:r>
+                      <a:endParaRPr lang="en-US" dirty="0"/>
+                    </a:p>
+                  </a:txBody>
+                  <a:tcPr/>
+                </a:tc>
+              </a:tr>
+              <a:tr h="370840">
+                <a:tc>
+                  <a:txBody>
+                    <a:bodyPr/>
+                    <a:lstStyle/>
+                    <a:p>
+                      <a:r>
+                        <a:rPr lang="en-US" dirty="0" smtClean="0"/>
+                        <a:t>Id</a:t>
+                      </a:r>
+                      <a:endParaRPr lang="en-US" dirty="0"/>
+                    </a:p>
+                  </a:txBody>
+                  <a:tcPr/>
+                </a:tc>
+                <a:tc>
+                  <a:txBody>
+                    <a:bodyPr/>
+                    <a:lstStyle/>
+                    <a:p>
+                      <a:r>
+                        <a:rPr lang="en-US" dirty="0" err="1" smtClean="0"/>
+                        <a:t>ObjectId</a:t>
+                      </a:r>
+                      <a:endParaRPr lang="en-US" dirty="0"/>
+                    </a:p>
+                  </a:txBody>
+                  <a:tcPr/>
+                </a:tc>
+                <a:tc>
+                  <a:txBody>
+                    <a:bodyPr/>
+                    <a:lstStyle/>
+                    <a:p>
+                      <a:endParaRPr lang="en-US" dirty="0"/>
+                    </a:p>
+                  </a:txBody>
+                  <a:tcPr/>
+                </a:tc>
+              </a:tr>
+              <a:tr h="370840">
+                <a:tc>
+                  <a:txBody>
+                    <a:bodyPr/>
+                    <a:lstStyle/>
+                    <a:p>
+                      <a:r>
+                        <a:rPr lang="en-US" dirty="0" err="1" smtClean="0"/>
+                        <a:t>SupPincode</a:t>
+                      </a:r>
+                      <a:endParaRPr lang="en-US" dirty="0"/>
+                    </a:p>
+                  </a:txBody>
+                  <a:tcPr/>
+                </a:tc>
+                <a:tc>
+                  <a:txBody>
+                    <a:bodyPr/>
+                    <a:lstStyle/>
+                    <a:p>
+                      <a:r>
+                        <a:rPr lang="en-US" dirty="0" smtClean="0"/>
+                        <a:t>String</a:t>
+                      </a:r>
+                      <a:endParaRPr lang="en-US" dirty="0"/>
+                    </a:p>
+                  </a:txBody>
+                  <a:tcPr/>
+                </a:tc>
+                <a:tc>
+                  <a:txBody>
+                    <a:bodyPr/>
+                    <a:lstStyle/>
+                    <a:p>
+                      <a:r>
+                        <a:rPr lang="en-US" dirty="0" smtClean="0"/>
+                        <a:t>The supervisor </a:t>
+                      </a:r>
+                      <a:r>
+                        <a:rPr lang="en-US" dirty="0" err="1" smtClean="0"/>
+                        <a:t>pincode</a:t>
+                      </a:r>
+                      <a:endParaRPr lang="en-US" dirty="0"/>
+                    </a:p>
+                  </a:txBody>
+                  <a:tcPr/>
+                </a:tc>
+              </a:tr>
+              <a:tr h="370840">
+                <a:tc>
+                  <a:txBody>
+                    <a:bodyPr/>
+                    <a:lstStyle/>
+                    <a:p>
+                      <a:r>
+                        <a:rPr lang="en-US" dirty="0" err="1" smtClean="0"/>
+                        <a:t>ReportOutputDir</a:t>
+                      </a:r>
+                      <a:endParaRPr lang="en-US" dirty="0"/>
+                    </a:p>
+                  </a:txBody>
+                  <a:tcPr/>
+                </a:tc>
+                <a:tc>
+                  <a:txBody>
+                    <a:bodyPr/>
+                    <a:lstStyle/>
+                    <a:p>
+                      <a:r>
+                        <a:rPr lang="en-US" dirty="0" smtClean="0"/>
+                        <a:t>String</a:t>
+                      </a:r>
+                      <a:endParaRPr lang="en-US" dirty="0"/>
+                    </a:p>
+                  </a:txBody>
+                  <a:tcPr/>
+                </a:tc>
+                <a:tc>
+                  <a:txBody>
+                    <a:bodyPr/>
+                    <a:lstStyle/>
+                    <a:p>
+                      <a:r>
+                        <a:rPr lang="en-US" dirty="0" smtClean="0"/>
+                        <a:t>The</a:t>
+                      </a:r>
+                      <a:r>
+                        <a:rPr lang="en-US" baseline="0" dirty="0" smtClean="0"/>
+                        <a:t> Directory path that </a:t>
+                      </a:r>
+                      <a:r>
+                        <a:rPr lang="en-US" baseline="0" dirty="0" err="1" smtClean="0"/>
+                        <a:t>report’ll</a:t>
+                      </a:r>
+                      <a:r>
+                        <a:rPr lang="en-US" baseline="0" dirty="0" smtClean="0"/>
+                        <a:t> be generated</a:t>
+                      </a:r>
+                      <a:endParaRPr lang="en-US" dirty="0"/>
+                    </a:p>
+                  </a:txBody>
+                  <a:tcPr/>
+                </a:tc>
+              </a:tr>
+            </a:tbl>
+          </a:graphicData>
+        </a:graphic>
+      </p:graphicFrame>
+    </p:spTree>
   </p:cSld>
   <p:clrMapOvr>
     <a:masterClrMapping/>
@@ -6632,7 +6901,7 @@
   <a:extraClrSchemeLst/>
   <a:extLst>
     <a:ext uri="{05A4C25C-085E-4340-85A3-A5531E510DB2}">
-      <thm15:themeFamily xmlns="" xmlns:thm15="http://schemas.microsoft.com/office/thememl/2012/main" name="Office Theme" id="{62F939B6-93AF-4DB8-9C6B-D6C7DFDC589F}" vid="{4A3C46E8-61CC-4603-A589-7422A47A8E4A}"/>
+      <thm15:themeFamily xmlns:thm15="http://schemas.microsoft.com/office/thememl/2012/main" xmlns="" name="Office Theme" id="{62F939B6-93AF-4DB8-9C6B-D6C7DFDC589F}" vid="{4A3C46E8-61CC-4603-A589-7422A47A8E4A}"/>
     </a:ext>
   </a:extLst>
 </a:theme>

</xml_diff>